<commit_message>
Implementação da camada Application com CQRS utilizando MediatR, FluentValidation e Automapper.
</commit_message>
<xml_diff>
--- a/CleanArchitecture.WebAPI/AppData/Usando a Clean Architecture.pptx
+++ b/CleanArchitecture.WebAPI/AppData/Usando a Clean Architecture.pptx
@@ -8,6 +8,8 @@
     <p:sldId id="256" r:id="rId2"/>
     <p:sldId id="257" r:id="rId3"/>
     <p:sldId id="258" r:id="rId4"/>
+    <p:sldId id="259" r:id="rId5"/>
+    <p:sldId id="260" r:id="rId6"/>
   </p:sldIdLst>
   <p:sldSz cx="12192000" cy="6858000"/>
   <p:notesSz cx="6858000" cy="9144000"/>
@@ -106,6 +108,11 @@
       </a:defRPr>
     </a:lvl9pPr>
   </p:defaultTextStyle>
+  <p:extLst>
+    <p:ext uri="{EFAFB233-063F-42B5-8137-9DF3F51BA10A}">
+      <p15:sldGuideLst xmlns:p15="http://schemas.microsoft.com/office/powerpoint/2012/main"/>
+    </p:ext>
+  </p:extLst>
 </p:presentation>
 </file>
 
@@ -256,7 +263,7 @@
           <a:p>
             <a:fld id="{48CCDA92-27FB-42B3-A511-B694CC1D85BD}" type="datetimeFigureOut">
               <a:rPr lang="pt-BR" smtClean="0"/>
-              <a:t>05/10/2023</a:t>
+              <a:t>17/10/2023</a:t>
             </a:fld>
             <a:endParaRPr lang="pt-BR"/>
           </a:p>
@@ -454,7 +461,7 @@
           <a:p>
             <a:fld id="{48CCDA92-27FB-42B3-A511-B694CC1D85BD}" type="datetimeFigureOut">
               <a:rPr lang="pt-BR" smtClean="0"/>
-              <a:t>05/10/2023</a:t>
+              <a:t>17/10/2023</a:t>
             </a:fld>
             <a:endParaRPr lang="pt-BR"/>
           </a:p>
@@ -662,7 +669,7 @@
           <a:p>
             <a:fld id="{48CCDA92-27FB-42B3-A511-B694CC1D85BD}" type="datetimeFigureOut">
               <a:rPr lang="pt-BR" smtClean="0"/>
-              <a:t>05/10/2023</a:t>
+              <a:t>17/10/2023</a:t>
             </a:fld>
             <a:endParaRPr lang="pt-BR"/>
           </a:p>
@@ -860,7 +867,7 @@
           <a:p>
             <a:fld id="{48CCDA92-27FB-42B3-A511-B694CC1D85BD}" type="datetimeFigureOut">
               <a:rPr lang="pt-BR" smtClean="0"/>
-              <a:t>05/10/2023</a:t>
+              <a:t>17/10/2023</a:t>
             </a:fld>
             <a:endParaRPr lang="pt-BR"/>
           </a:p>
@@ -1135,7 +1142,7 @@
           <a:p>
             <a:fld id="{48CCDA92-27FB-42B3-A511-B694CC1D85BD}" type="datetimeFigureOut">
               <a:rPr lang="pt-BR" smtClean="0"/>
-              <a:t>05/10/2023</a:t>
+              <a:t>17/10/2023</a:t>
             </a:fld>
             <a:endParaRPr lang="pt-BR"/>
           </a:p>
@@ -1400,7 +1407,7 @@
           <a:p>
             <a:fld id="{48CCDA92-27FB-42B3-A511-B694CC1D85BD}" type="datetimeFigureOut">
               <a:rPr lang="pt-BR" smtClean="0"/>
-              <a:t>05/10/2023</a:t>
+              <a:t>17/10/2023</a:t>
             </a:fld>
             <a:endParaRPr lang="pt-BR"/>
           </a:p>
@@ -1812,7 +1819,7 @@
           <a:p>
             <a:fld id="{48CCDA92-27FB-42B3-A511-B694CC1D85BD}" type="datetimeFigureOut">
               <a:rPr lang="pt-BR" smtClean="0"/>
-              <a:t>05/10/2023</a:t>
+              <a:t>17/10/2023</a:t>
             </a:fld>
             <a:endParaRPr lang="pt-BR"/>
           </a:p>
@@ -1953,7 +1960,7 @@
           <a:p>
             <a:fld id="{48CCDA92-27FB-42B3-A511-B694CC1D85BD}" type="datetimeFigureOut">
               <a:rPr lang="pt-BR" smtClean="0"/>
-              <a:t>05/10/2023</a:t>
+              <a:t>17/10/2023</a:t>
             </a:fld>
             <a:endParaRPr lang="pt-BR"/>
           </a:p>
@@ -2066,7 +2073,7 @@
           <a:p>
             <a:fld id="{48CCDA92-27FB-42B3-A511-B694CC1D85BD}" type="datetimeFigureOut">
               <a:rPr lang="pt-BR" smtClean="0"/>
-              <a:t>05/10/2023</a:t>
+              <a:t>17/10/2023</a:t>
             </a:fld>
             <a:endParaRPr lang="pt-BR"/>
           </a:p>
@@ -2377,7 +2384,7 @@
           <a:p>
             <a:fld id="{48CCDA92-27FB-42B3-A511-B694CC1D85BD}" type="datetimeFigureOut">
               <a:rPr lang="pt-BR" smtClean="0"/>
-              <a:t>05/10/2023</a:t>
+              <a:t>17/10/2023</a:t>
             </a:fld>
             <a:endParaRPr lang="pt-BR"/>
           </a:p>
@@ -2665,7 +2672,7 @@
           <a:p>
             <a:fld id="{48CCDA92-27FB-42B3-A511-B694CC1D85BD}" type="datetimeFigureOut">
               <a:rPr lang="pt-BR" smtClean="0"/>
-              <a:t>05/10/2023</a:t>
+              <a:t>17/10/2023</a:t>
             </a:fld>
             <a:endParaRPr lang="pt-BR"/>
           </a:p>
@@ -2906,7 +2913,7 @@
           <a:p>
             <a:fld id="{48CCDA92-27FB-42B3-A511-B694CC1D85BD}" type="datetimeFigureOut">
               <a:rPr lang="pt-BR" smtClean="0"/>
-              <a:t>05/10/2023</a:t>
+              <a:t>17/10/2023</a:t>
             </a:fld>
             <a:endParaRPr lang="pt-BR"/>
           </a:p>
@@ -3547,7 +3554,7 @@
         </p:nvSpPr>
         <p:spPr>
           <a:xfrm>
-            <a:off x="2552697" y="5052638"/>
+            <a:off x="2600322" y="4160284"/>
             <a:ext cx="1476375" cy="523875"/>
           </a:xfrm>
           <a:prstGeom prst="rect">
@@ -3603,7 +3610,7 @@
         </p:nvSpPr>
         <p:spPr>
           <a:xfrm>
-            <a:off x="2552696" y="5919413"/>
+            <a:off x="2600321" y="5027059"/>
             <a:ext cx="1476375" cy="523875"/>
           </a:xfrm>
           <a:prstGeom prst="rect">
@@ -3817,7 +3824,7 @@
         </p:nvSpPr>
         <p:spPr>
           <a:xfrm>
-            <a:off x="5572121" y="2050731"/>
+            <a:off x="5558473" y="2037083"/>
             <a:ext cx="2609851" cy="577081"/>
           </a:xfrm>
           <a:prstGeom prst="rect">
@@ -3869,6 +3876,41 @@
             <a:r>
               <a:rPr lang="pt-BR" sz="1050" dirty="0"/>
               <a:t>Aqui será criado a classe de contexto do Entity Core (DbContext) e a implementação dos repositórios, além do ServiceExntesions</a:t>
+            </a:r>
+          </a:p>
+        </p:txBody>
+      </p:sp>
+      <p:sp>
+        <p:nvSpPr>
+          <p:cNvPr id="2" name="CaixaDeTexto 1">
+            <a:extLst>
+              <a:ext uri="{FF2B5EF4-FFF2-40B4-BE49-F238E27FC236}">
+                <a16:creationId xmlns:a16="http://schemas.microsoft.com/office/drawing/2014/main" id="{EE989B49-A124-13D0-58A5-386FF3B5C41F}"/>
+              </a:ext>
+            </a:extLst>
+          </p:cNvPr>
+          <p:cNvSpPr txBox="1"/>
+          <p:nvPr/>
+        </p:nvSpPr>
+        <p:spPr>
+          <a:xfrm>
+            <a:off x="4200520" y="1270708"/>
+            <a:ext cx="3060089" cy="577081"/>
+          </a:xfrm>
+          <a:prstGeom prst="rect">
+            <a:avLst/>
+          </a:prstGeom>
+          <a:noFill/>
+        </p:spPr>
+        <p:txBody>
+          <a:bodyPr wrap="square" rtlCol="0">
+            <a:spAutoFit/>
+          </a:bodyPr>
+          <a:lstStyle/>
+          <a:p>
+            <a:r>
+              <a:rPr lang="pt-BR" sz="1050" dirty="0"/>
+              <a:t>A camada Application atua como uma ponte (serviços) entre a camada de domínio (persistências) e as interfaces externas da aplicação</a:t>
             </a:r>
           </a:p>
         </p:txBody>
@@ -3959,7 +4001,7 @@
         </p:nvSpPr>
         <p:spPr>
           <a:xfrm>
-            <a:off x="733425" y="1417881"/>
+            <a:off x="433169" y="1417881"/>
             <a:ext cx="1476375" cy="523875"/>
           </a:xfrm>
           <a:prstGeom prst="rect">
@@ -4015,7 +4057,7 @@
         </p:nvSpPr>
         <p:spPr>
           <a:xfrm>
-            <a:off x="2724151" y="1384289"/>
+            <a:off x="2860630" y="1384289"/>
             <a:ext cx="1943092" cy="555616"/>
           </a:xfrm>
           <a:prstGeom prst="rect">
@@ -4071,7 +4113,7 @@
         </p:nvSpPr>
         <p:spPr>
           <a:xfrm>
-            <a:off x="5114926" y="1384289"/>
+            <a:off x="5251405" y="1384289"/>
             <a:ext cx="2033578" cy="560703"/>
           </a:xfrm>
           <a:prstGeom prst="rect">
@@ -4127,7 +4169,7 @@
         </p:nvSpPr>
         <p:spPr>
           <a:xfrm>
-            <a:off x="7562838" y="1412864"/>
+            <a:off x="8149694" y="1412864"/>
             <a:ext cx="1476375" cy="523875"/>
           </a:xfrm>
           <a:prstGeom prst="rect">
@@ -4183,7 +4225,7 @@
         </p:nvSpPr>
         <p:spPr>
           <a:xfrm>
-            <a:off x="9677396" y="1412864"/>
+            <a:off x="10264252" y="1412864"/>
             <a:ext cx="1476375" cy="523875"/>
           </a:xfrm>
           <a:prstGeom prst="rect">
@@ -4254,7 +4296,7 @@
         </p:blipFill>
         <p:spPr bwMode="auto">
           <a:xfrm>
-            <a:off x="2876546" y="2083492"/>
+            <a:off x="3013025" y="2083492"/>
             <a:ext cx="398071" cy="307283"/>
           </a:xfrm>
           <a:prstGeom prst="rect">
@@ -4286,7 +4328,7 @@
         </p:nvSpPr>
         <p:spPr>
           <a:xfrm>
-            <a:off x="3309937" y="2112067"/>
+            <a:off x="3446416" y="2112067"/>
             <a:ext cx="576263" cy="276999"/>
           </a:xfrm>
           <a:prstGeom prst="rect">
@@ -4321,7 +4363,7 @@
         </p:nvSpPr>
         <p:spPr>
           <a:xfrm>
-            <a:off x="3309937" y="2423228"/>
+            <a:off x="3446416" y="2423228"/>
             <a:ext cx="1057275" cy="461665"/>
           </a:xfrm>
           <a:prstGeom prst="rect">
@@ -4389,7 +4431,7 @@
         </p:blipFill>
         <p:spPr bwMode="auto">
           <a:xfrm>
-            <a:off x="2876546" y="3014305"/>
+            <a:off x="3013025" y="3014305"/>
             <a:ext cx="398071" cy="307283"/>
           </a:xfrm>
           <a:prstGeom prst="rect">
@@ -4421,7 +4463,7 @@
         </p:nvSpPr>
         <p:spPr>
           <a:xfrm>
-            <a:off x="3309937" y="3042880"/>
+            <a:off x="3446416" y="3042880"/>
             <a:ext cx="881063" cy="276999"/>
           </a:xfrm>
           <a:prstGeom prst="rect">
@@ -4456,7 +4498,7 @@
         </p:nvSpPr>
         <p:spPr>
           <a:xfrm>
-            <a:off x="3309937" y="3344516"/>
+            <a:off x="3446416" y="3344516"/>
             <a:ext cx="1433513" cy="646331"/>
           </a:xfrm>
           <a:prstGeom prst="rect">
@@ -4524,7 +4566,7 @@
         </p:nvCxnSpPr>
         <p:spPr>
           <a:xfrm rot="16200000" flipH="1">
-            <a:off x="3061116" y="2405240"/>
+            <a:off x="3197595" y="2405240"/>
             <a:ext cx="263286" cy="234355"/>
           </a:xfrm>
           <a:prstGeom prst="bentConnector2">
@@ -4566,7 +4608,7 @@
         </p:nvCxnSpPr>
         <p:spPr>
           <a:xfrm rot="16200000" flipH="1">
-            <a:off x="3019712" y="3377457"/>
+            <a:off x="3156191" y="3377457"/>
             <a:ext cx="346094" cy="234355"/>
           </a:xfrm>
           <a:prstGeom prst="bentConnector2">
@@ -4620,7 +4662,7 @@
         </p:blipFill>
         <p:spPr bwMode="auto">
           <a:xfrm>
-            <a:off x="5272076" y="2083492"/>
+            <a:off x="5408555" y="2083492"/>
             <a:ext cx="398071" cy="307283"/>
           </a:xfrm>
           <a:prstGeom prst="rect">
@@ -4652,7 +4694,7 @@
         </p:nvSpPr>
         <p:spPr>
           <a:xfrm>
-            <a:off x="5705467" y="2112067"/>
+            <a:off x="5841946" y="2112067"/>
             <a:ext cx="884824" cy="276999"/>
           </a:xfrm>
           <a:prstGeom prst="rect">
@@ -4687,7 +4729,7 @@
         </p:nvSpPr>
         <p:spPr>
           <a:xfrm>
-            <a:off x="5705467" y="2461328"/>
+            <a:off x="5841946" y="2461328"/>
             <a:ext cx="1276358" cy="276999"/>
           </a:xfrm>
           <a:prstGeom prst="rect">
@@ -4732,7 +4774,7 @@
         </p:nvCxnSpPr>
         <p:spPr>
           <a:xfrm rot="16200000" flipH="1">
-            <a:off x="5483763" y="2378123"/>
+            <a:off x="5620242" y="2378123"/>
             <a:ext cx="209053" cy="234355"/>
           </a:xfrm>
           <a:prstGeom prst="bentConnector2">
@@ -4786,7 +4828,7 @@
         </p:blipFill>
         <p:spPr bwMode="auto">
           <a:xfrm>
-            <a:off x="5281601" y="3033355"/>
+            <a:off x="5418080" y="3033355"/>
             <a:ext cx="398071" cy="307283"/>
           </a:xfrm>
           <a:prstGeom prst="rect">
@@ -4818,7 +4860,7 @@
         </p:nvSpPr>
         <p:spPr>
           <a:xfrm>
-            <a:off x="5714991" y="3061930"/>
+            <a:off x="5851470" y="3061930"/>
             <a:ext cx="1057275" cy="276999"/>
           </a:xfrm>
           <a:prstGeom prst="rect">
@@ -4853,7 +4895,7 @@
         </p:nvSpPr>
         <p:spPr>
           <a:xfrm>
-            <a:off x="5714991" y="3333622"/>
+            <a:off x="5851470" y="3333622"/>
             <a:ext cx="1433513" cy="646331"/>
           </a:xfrm>
           <a:prstGeom prst="rect">
@@ -4921,7 +4963,7 @@
         </p:nvCxnSpPr>
         <p:spPr>
           <a:xfrm rot="16200000" flipH="1">
-            <a:off x="5439739" y="3381536"/>
+            <a:off x="5576218" y="3381536"/>
             <a:ext cx="316150" cy="234354"/>
           </a:xfrm>
           <a:prstGeom prst="bentConnector2">
@@ -4963,7 +5005,7 @@
         </p:nvCxnSpPr>
         <p:spPr>
           <a:xfrm>
-            <a:off x="4191000" y="3181380"/>
+            <a:off x="4327479" y="3181380"/>
             <a:ext cx="923925" cy="0"/>
           </a:xfrm>
           <a:prstGeom prst="straightConnector1">
@@ -5003,7 +5045,7 @@
         </p:nvSpPr>
         <p:spPr>
           <a:xfrm>
-            <a:off x="5233982" y="4171178"/>
+            <a:off x="621614" y="2457171"/>
             <a:ext cx="1538284" cy="276999"/>
           </a:xfrm>
           <a:prstGeom prst="rect">
@@ -5046,7 +5088,7 @@
         </p:nvCxnSpPr>
         <p:spPr>
           <a:xfrm>
-            <a:off x="4190999" y="2250566"/>
+            <a:off x="4327478" y="2250566"/>
             <a:ext cx="923925" cy="0"/>
           </a:xfrm>
           <a:prstGeom prst="straightConnector1">
@@ -5056,6 +5098,767 @@
             <a:headEnd type="triangle"/>
             <a:tailEnd type="triangle"/>
           </a:ln>
+        </p:spPr>
+        <p:style>
+          <a:lnRef idx="1">
+            <a:schemeClr val="accent1"/>
+          </a:lnRef>
+          <a:fillRef idx="0">
+            <a:schemeClr val="accent1"/>
+          </a:fillRef>
+          <a:effectRef idx="0">
+            <a:schemeClr val="accent1"/>
+          </a:effectRef>
+          <a:fontRef idx="minor">
+            <a:schemeClr val="tx1"/>
+          </a:fontRef>
+        </p:style>
+      </p:cxnSp>
+      <p:pic>
+        <p:nvPicPr>
+          <p:cNvPr id="2" name="Picture 2">
+            <a:extLst>
+              <a:ext uri="{FF2B5EF4-FFF2-40B4-BE49-F238E27FC236}">
+                <a16:creationId xmlns:a16="http://schemas.microsoft.com/office/drawing/2014/main" id="{AACA71FF-94D2-9432-EF78-0E5529948364}"/>
+              </a:ext>
+            </a:extLst>
+          </p:cNvPr>
+          <p:cNvPicPr>
+            <a:picLocks noChangeAspect="1" noChangeArrowheads="1"/>
+          </p:cNvPicPr>
+          <p:nvPr/>
+        </p:nvPicPr>
+        <p:blipFill>
+          <a:blip r:embed="rId2">
+            <a:extLst>
+              <a:ext uri="{28A0092B-C50C-407E-A947-70E740481C1C}">
+                <a14:useLocalDpi xmlns:a14="http://schemas.microsoft.com/office/drawing/2010/main" val="0"/>
+              </a:ext>
+            </a:extLst>
+          </a:blip>
+          <a:srcRect/>
+          <a:stretch>
+            <a:fillRect/>
+          </a:stretch>
+        </p:blipFill>
+        <p:spPr bwMode="auto">
+          <a:xfrm>
+            <a:off x="646617" y="2100162"/>
+            <a:ext cx="398071" cy="307283"/>
+          </a:xfrm>
+          <a:prstGeom prst="rect">
+            <a:avLst/>
+          </a:prstGeom>
+          <a:noFill/>
+          <a:extLst>
+            <a:ext uri="{909E8E84-426E-40DD-AFC4-6F175D3DCCD1}">
+              <a14:hiddenFill xmlns:a14="http://schemas.microsoft.com/office/drawing/2010/main">
+                <a:solidFill>
+                  <a:srgbClr val="FFFFFF"/>
+                </a:solidFill>
+              </a14:hiddenFill>
+            </a:ext>
+          </a:extLst>
+        </p:spPr>
+      </p:pic>
+      <p:sp>
+        <p:nvSpPr>
+          <p:cNvPr id="4" name="CaixaDeTexto 3">
+            <a:extLst>
+              <a:ext uri="{FF2B5EF4-FFF2-40B4-BE49-F238E27FC236}">
+                <a16:creationId xmlns:a16="http://schemas.microsoft.com/office/drawing/2014/main" id="{54B154B4-1E0F-EDE2-DAFD-835E22E2B433}"/>
+              </a:ext>
+            </a:extLst>
+          </p:cNvPr>
+          <p:cNvSpPr txBox="1"/>
+          <p:nvPr/>
+        </p:nvSpPr>
+        <p:spPr>
+          <a:xfrm>
+            <a:off x="1080008" y="2128737"/>
+            <a:ext cx="810493" cy="276999"/>
+          </a:xfrm>
+          <a:prstGeom prst="rect">
+            <a:avLst/>
+          </a:prstGeom>
+          <a:noFill/>
+        </p:spPr>
+        <p:txBody>
+          <a:bodyPr wrap="square">
+            <a:spAutoFit/>
+          </a:bodyPr>
+          <a:lstStyle/>
+          <a:p>
+            <a:r>
+              <a:rPr lang="pt-BR" sz="1200" dirty="0"/>
+              <a:t>Services</a:t>
+            </a:r>
+          </a:p>
+        </p:txBody>
+      </p:sp>
+      <p:pic>
+        <p:nvPicPr>
+          <p:cNvPr id="13" name="Picture 2">
+            <a:extLst>
+              <a:ext uri="{FF2B5EF4-FFF2-40B4-BE49-F238E27FC236}">
+                <a16:creationId xmlns:a16="http://schemas.microsoft.com/office/drawing/2014/main" id="{7D78AAA1-DBB9-20EC-6A3A-12E7746F598A}"/>
+              </a:ext>
+            </a:extLst>
+          </p:cNvPr>
+          <p:cNvPicPr>
+            <a:picLocks noChangeAspect="1" noChangeArrowheads="1"/>
+          </p:cNvPicPr>
+          <p:nvPr/>
+        </p:nvPicPr>
+        <p:blipFill>
+          <a:blip r:embed="rId2">
+            <a:extLst>
+              <a:ext uri="{28A0092B-C50C-407E-A947-70E740481C1C}">
+                <a14:useLocalDpi xmlns:a14="http://schemas.microsoft.com/office/drawing/2010/main" val="0"/>
+              </a:ext>
+            </a:extLst>
+          </a:blip>
+          <a:srcRect/>
+          <a:stretch>
+            <a:fillRect/>
+          </a:stretch>
+        </p:blipFill>
+        <p:spPr bwMode="auto">
+          <a:xfrm>
+            <a:off x="601821" y="2962978"/>
+            <a:ext cx="398071" cy="307283"/>
+          </a:xfrm>
+          <a:prstGeom prst="rect">
+            <a:avLst/>
+          </a:prstGeom>
+          <a:noFill/>
+          <a:extLst>
+            <a:ext uri="{909E8E84-426E-40DD-AFC4-6F175D3DCCD1}">
+              <a14:hiddenFill xmlns:a14="http://schemas.microsoft.com/office/drawing/2010/main">
+                <a:solidFill>
+                  <a:srgbClr val="FFFFFF"/>
+                </a:solidFill>
+              </a14:hiddenFill>
+            </a:ext>
+          </a:extLst>
+        </p:spPr>
+      </p:pic>
+      <p:sp>
+        <p:nvSpPr>
+          <p:cNvPr id="14" name="CaixaDeTexto 13">
+            <a:extLst>
+              <a:ext uri="{FF2B5EF4-FFF2-40B4-BE49-F238E27FC236}">
+                <a16:creationId xmlns:a16="http://schemas.microsoft.com/office/drawing/2014/main" id="{702ACA16-D1AD-8FD3-CD90-A7ED40AFC212}"/>
+              </a:ext>
+            </a:extLst>
+          </p:cNvPr>
+          <p:cNvSpPr txBox="1"/>
+          <p:nvPr/>
+        </p:nvSpPr>
+        <p:spPr>
+          <a:xfrm>
+            <a:off x="1035212" y="2991553"/>
+            <a:ext cx="810493" cy="276999"/>
+          </a:xfrm>
+          <a:prstGeom prst="rect">
+            <a:avLst/>
+          </a:prstGeom>
+          <a:noFill/>
+        </p:spPr>
+        <p:txBody>
+          <a:bodyPr wrap="square">
+            <a:spAutoFit/>
+          </a:bodyPr>
+          <a:lstStyle/>
+          <a:p>
+            <a:r>
+              <a:rPr lang="pt-BR" sz="1200" dirty="0"/>
+              <a:t>Shared</a:t>
+            </a:r>
+          </a:p>
+        </p:txBody>
+      </p:sp>
+      <p:pic>
+        <p:nvPicPr>
+          <p:cNvPr id="15" name="Picture 2">
+            <a:extLst>
+              <a:ext uri="{FF2B5EF4-FFF2-40B4-BE49-F238E27FC236}">
+                <a16:creationId xmlns:a16="http://schemas.microsoft.com/office/drawing/2014/main" id="{340DEBF7-E5EC-6CDB-F622-87D6491DBF79}"/>
+              </a:ext>
+            </a:extLst>
+          </p:cNvPr>
+          <p:cNvPicPr>
+            <a:picLocks noChangeAspect="1" noChangeArrowheads="1"/>
+          </p:cNvPicPr>
+          <p:nvPr/>
+        </p:nvPicPr>
+        <p:blipFill>
+          <a:blip r:embed="rId2">
+            <a:extLst>
+              <a:ext uri="{28A0092B-C50C-407E-A947-70E740481C1C}">
+                <a14:useLocalDpi xmlns:a14="http://schemas.microsoft.com/office/drawing/2010/main" val="0"/>
+              </a:ext>
+            </a:extLst>
+          </a:blip>
+          <a:srcRect/>
+          <a:stretch>
+            <a:fillRect/>
+          </a:stretch>
+        </p:blipFill>
+        <p:spPr bwMode="auto">
+          <a:xfrm>
+            <a:off x="921519" y="3511157"/>
+            <a:ext cx="398071" cy="307283"/>
+          </a:xfrm>
+          <a:prstGeom prst="rect">
+            <a:avLst/>
+          </a:prstGeom>
+          <a:noFill/>
+          <a:extLst>
+            <a:ext uri="{909E8E84-426E-40DD-AFC4-6F175D3DCCD1}">
+              <a14:hiddenFill xmlns:a14="http://schemas.microsoft.com/office/drawing/2010/main">
+                <a:solidFill>
+                  <a:srgbClr val="FFFFFF"/>
+                </a:solidFill>
+              </a14:hiddenFill>
+            </a:ext>
+          </a:extLst>
+        </p:spPr>
+      </p:pic>
+      <p:sp>
+        <p:nvSpPr>
+          <p:cNvPr id="16" name="CaixaDeTexto 15">
+            <a:extLst>
+              <a:ext uri="{FF2B5EF4-FFF2-40B4-BE49-F238E27FC236}">
+                <a16:creationId xmlns:a16="http://schemas.microsoft.com/office/drawing/2014/main" id="{571965CE-DF86-6E8F-5B7F-BFCB4E08713F}"/>
+              </a:ext>
+            </a:extLst>
+          </p:cNvPr>
+          <p:cNvSpPr txBox="1"/>
+          <p:nvPr/>
+        </p:nvSpPr>
+        <p:spPr>
+          <a:xfrm>
+            <a:off x="1354910" y="3539732"/>
+            <a:ext cx="810493" cy="276999"/>
+          </a:xfrm>
+          <a:prstGeom prst="rect">
+            <a:avLst/>
+          </a:prstGeom>
+          <a:noFill/>
+        </p:spPr>
+        <p:txBody>
+          <a:bodyPr wrap="square">
+            <a:spAutoFit/>
+          </a:bodyPr>
+          <a:lstStyle/>
+          <a:p>
+            <a:r>
+              <a:rPr lang="pt-BR" sz="1200" dirty="0"/>
+              <a:t>Behavior</a:t>
+            </a:r>
+          </a:p>
+        </p:txBody>
+      </p:sp>
+      <p:pic>
+        <p:nvPicPr>
+          <p:cNvPr id="17" name="Picture 2">
+            <a:extLst>
+              <a:ext uri="{FF2B5EF4-FFF2-40B4-BE49-F238E27FC236}">
+                <a16:creationId xmlns:a16="http://schemas.microsoft.com/office/drawing/2014/main" id="{74CC34DF-85C2-B16C-1F2D-6C37AB8C19F9}"/>
+              </a:ext>
+            </a:extLst>
+          </p:cNvPr>
+          <p:cNvPicPr>
+            <a:picLocks noChangeAspect="1" noChangeArrowheads="1"/>
+          </p:cNvPicPr>
+          <p:nvPr/>
+        </p:nvPicPr>
+        <p:blipFill>
+          <a:blip r:embed="rId2">
+            <a:extLst>
+              <a:ext uri="{28A0092B-C50C-407E-A947-70E740481C1C}">
+                <a14:useLocalDpi xmlns:a14="http://schemas.microsoft.com/office/drawing/2010/main" val="0"/>
+              </a:ext>
+            </a:extLst>
+          </a:blip>
+          <a:srcRect/>
+          <a:stretch>
+            <a:fillRect/>
+          </a:stretch>
+        </p:blipFill>
+        <p:spPr bwMode="auto">
+          <a:xfrm>
+            <a:off x="929193" y="4150396"/>
+            <a:ext cx="398071" cy="307283"/>
+          </a:xfrm>
+          <a:prstGeom prst="rect">
+            <a:avLst/>
+          </a:prstGeom>
+          <a:noFill/>
+          <a:extLst>
+            <a:ext uri="{909E8E84-426E-40DD-AFC4-6F175D3DCCD1}">
+              <a14:hiddenFill xmlns:a14="http://schemas.microsoft.com/office/drawing/2010/main">
+                <a:solidFill>
+                  <a:srgbClr val="FFFFFF"/>
+                </a:solidFill>
+              </a14:hiddenFill>
+            </a:ext>
+          </a:extLst>
+        </p:spPr>
+      </p:pic>
+      <p:sp>
+        <p:nvSpPr>
+          <p:cNvPr id="18" name="CaixaDeTexto 17">
+            <a:extLst>
+              <a:ext uri="{FF2B5EF4-FFF2-40B4-BE49-F238E27FC236}">
+                <a16:creationId xmlns:a16="http://schemas.microsoft.com/office/drawing/2014/main" id="{8BF9B522-8C6A-5D87-5F11-1945CAA36174}"/>
+              </a:ext>
+            </a:extLst>
+          </p:cNvPr>
+          <p:cNvSpPr txBox="1"/>
+          <p:nvPr/>
+        </p:nvSpPr>
+        <p:spPr>
+          <a:xfrm>
+            <a:off x="1362584" y="4178971"/>
+            <a:ext cx="945830" cy="276999"/>
+          </a:xfrm>
+          <a:prstGeom prst="rect">
+            <a:avLst/>
+          </a:prstGeom>
+          <a:noFill/>
+        </p:spPr>
+        <p:txBody>
+          <a:bodyPr wrap="square">
+            <a:spAutoFit/>
+          </a:bodyPr>
+          <a:lstStyle/>
+          <a:p>
+            <a:r>
+              <a:rPr lang="pt-BR" sz="1200" dirty="0"/>
+              <a:t>Exceptions</a:t>
+            </a:r>
+          </a:p>
+        </p:txBody>
+      </p:sp>
+      <p:sp>
+        <p:nvSpPr>
+          <p:cNvPr id="29" name="CaixaDeTexto 28">
+            <a:extLst>
+              <a:ext uri="{FF2B5EF4-FFF2-40B4-BE49-F238E27FC236}">
+                <a16:creationId xmlns:a16="http://schemas.microsoft.com/office/drawing/2014/main" id="{B83EE387-0F51-C32F-2AC4-2B37CE9B02EB}"/>
+              </a:ext>
+            </a:extLst>
+          </p:cNvPr>
+          <p:cNvSpPr txBox="1"/>
+          <p:nvPr/>
+        </p:nvSpPr>
+        <p:spPr>
+          <a:xfrm>
+            <a:off x="1385108" y="3786564"/>
+            <a:ext cx="1538284" cy="276999"/>
+          </a:xfrm>
+          <a:prstGeom prst="rect">
+            <a:avLst/>
+          </a:prstGeom>
+          <a:noFill/>
+        </p:spPr>
+        <p:txBody>
+          <a:bodyPr wrap="square">
+            <a:spAutoFit/>
+          </a:bodyPr>
+          <a:lstStyle/>
+          <a:p>
+            <a:r>
+              <a:rPr lang="pt-BR" sz="1200" dirty="0">
+                <a:solidFill>
+                  <a:schemeClr val="accent6">
+                    <a:lumMod val="75000"/>
+                  </a:schemeClr>
+                </a:solidFill>
+              </a:rPr>
+              <a:t>ValidatorBehavior.cs</a:t>
+            </a:r>
+          </a:p>
+        </p:txBody>
+      </p:sp>
+      <p:sp>
+        <p:nvSpPr>
+          <p:cNvPr id="33" name="CaixaDeTexto 32">
+            <a:extLst>
+              <a:ext uri="{FF2B5EF4-FFF2-40B4-BE49-F238E27FC236}">
+                <a16:creationId xmlns:a16="http://schemas.microsoft.com/office/drawing/2014/main" id="{B0D07E13-6C7D-8FE5-7F00-DC18A5EF3FC3}"/>
+              </a:ext>
+            </a:extLst>
+          </p:cNvPr>
+          <p:cNvSpPr txBox="1"/>
+          <p:nvPr/>
+        </p:nvSpPr>
+        <p:spPr>
+          <a:xfrm>
+            <a:off x="1353693" y="4465031"/>
+            <a:ext cx="1881922" cy="276999"/>
+          </a:xfrm>
+          <a:prstGeom prst="rect">
+            <a:avLst/>
+          </a:prstGeom>
+          <a:noFill/>
+        </p:spPr>
+        <p:txBody>
+          <a:bodyPr wrap="square">
+            <a:spAutoFit/>
+          </a:bodyPr>
+          <a:lstStyle/>
+          <a:p>
+            <a:r>
+              <a:rPr lang="pt-BR" sz="1200" dirty="0">
+                <a:solidFill>
+                  <a:schemeClr val="accent6">
+                    <a:lumMod val="75000"/>
+                  </a:schemeClr>
+                </a:solidFill>
+              </a:rPr>
+              <a:t>BadRequestException.cs</a:t>
+            </a:r>
+          </a:p>
+        </p:txBody>
+      </p:sp>
+      <p:sp>
+        <p:nvSpPr>
+          <p:cNvPr id="35" name="CaixaDeTexto 34">
+            <a:extLst>
+              <a:ext uri="{FF2B5EF4-FFF2-40B4-BE49-F238E27FC236}">
+                <a16:creationId xmlns:a16="http://schemas.microsoft.com/office/drawing/2014/main" id="{04F31713-9F25-91D9-4F45-118CE664ED06}"/>
+              </a:ext>
+            </a:extLst>
+          </p:cNvPr>
+          <p:cNvSpPr txBox="1"/>
+          <p:nvPr/>
+        </p:nvSpPr>
+        <p:spPr>
+          <a:xfrm>
+            <a:off x="1354910" y="4695514"/>
+            <a:ext cx="1881922" cy="276999"/>
+          </a:xfrm>
+          <a:prstGeom prst="rect">
+            <a:avLst/>
+          </a:prstGeom>
+          <a:noFill/>
+        </p:spPr>
+        <p:txBody>
+          <a:bodyPr wrap="square">
+            <a:spAutoFit/>
+          </a:bodyPr>
+          <a:lstStyle/>
+          <a:p>
+            <a:r>
+              <a:rPr lang="pt-BR" sz="1200" dirty="0">
+                <a:solidFill>
+                  <a:schemeClr val="accent6">
+                    <a:lumMod val="75000"/>
+                  </a:schemeClr>
+                </a:solidFill>
+              </a:rPr>
+              <a:t>NotFoundException.cs</a:t>
+            </a:r>
+          </a:p>
+        </p:txBody>
+      </p:sp>
+      <p:cxnSp>
+        <p:nvCxnSpPr>
+          <p:cNvPr id="46" name="Conector: Angulado 45">
+            <a:extLst>
+              <a:ext uri="{FF2B5EF4-FFF2-40B4-BE49-F238E27FC236}">
+                <a16:creationId xmlns:a16="http://schemas.microsoft.com/office/drawing/2014/main" id="{9740074C-6E98-1BD7-A628-45514A759922}"/>
+              </a:ext>
+            </a:extLst>
+          </p:cNvPr>
+          <p:cNvCxnSpPr>
+            <a:stCxn id="13" idx="2"/>
+            <a:endCxn id="15" idx="0"/>
+          </p:cNvCxnSpPr>
+          <p:nvPr/>
+        </p:nvCxnSpPr>
+        <p:spPr>
+          <a:xfrm rot="16200000" flipH="1">
+            <a:off x="840258" y="3230860"/>
+            <a:ext cx="240896" cy="319698"/>
+          </a:xfrm>
+          <a:prstGeom prst="bentConnector3">
+            <a:avLst/>
+          </a:prstGeom>
+          <a:ln>
+            <a:tailEnd type="triangle"/>
+          </a:ln>
+        </p:spPr>
+        <p:style>
+          <a:lnRef idx="1">
+            <a:schemeClr val="accent1"/>
+          </a:lnRef>
+          <a:fillRef idx="0">
+            <a:schemeClr val="accent1"/>
+          </a:fillRef>
+          <a:effectRef idx="0">
+            <a:schemeClr val="accent1"/>
+          </a:effectRef>
+          <a:fontRef idx="minor">
+            <a:schemeClr val="tx1"/>
+          </a:fontRef>
+        </p:style>
+      </p:cxnSp>
+      <p:cxnSp>
+        <p:nvCxnSpPr>
+          <p:cNvPr id="50" name="Conector: Angulado 49">
+            <a:extLst>
+              <a:ext uri="{FF2B5EF4-FFF2-40B4-BE49-F238E27FC236}">
+                <a16:creationId xmlns:a16="http://schemas.microsoft.com/office/drawing/2014/main" id="{D12B5C05-2A23-D5D5-A873-C5AB26E63C92}"/>
+              </a:ext>
+            </a:extLst>
+          </p:cNvPr>
+          <p:cNvCxnSpPr>
+            <a:stCxn id="13" idx="2"/>
+            <a:endCxn id="17" idx="1"/>
+          </p:cNvCxnSpPr>
+          <p:nvPr/>
+        </p:nvCxnSpPr>
+        <p:spPr>
+          <a:xfrm rot="16200000" flipH="1">
+            <a:off x="348137" y="3722981"/>
+            <a:ext cx="1033777" cy="128336"/>
+          </a:xfrm>
+          <a:prstGeom prst="bentConnector2">
+            <a:avLst/>
+          </a:prstGeom>
+          <a:ln>
+            <a:tailEnd type="triangle"/>
+          </a:ln>
+        </p:spPr>
+        <p:style>
+          <a:lnRef idx="1">
+            <a:schemeClr val="accent1"/>
+          </a:lnRef>
+          <a:fillRef idx="0">
+            <a:schemeClr val="accent1"/>
+          </a:fillRef>
+          <a:effectRef idx="0">
+            <a:schemeClr val="accent1"/>
+          </a:effectRef>
+          <a:fontRef idx="minor">
+            <a:schemeClr val="tx1"/>
+          </a:fontRef>
+        </p:style>
+      </p:cxnSp>
+      <p:pic>
+        <p:nvPicPr>
+          <p:cNvPr id="51" name="Picture 2">
+            <a:extLst>
+              <a:ext uri="{FF2B5EF4-FFF2-40B4-BE49-F238E27FC236}">
+                <a16:creationId xmlns:a16="http://schemas.microsoft.com/office/drawing/2014/main" id="{1ECA8BDC-7564-DD1B-BB26-DBCB6834669E}"/>
+              </a:ext>
+            </a:extLst>
+          </p:cNvPr>
+          <p:cNvPicPr>
+            <a:picLocks noChangeAspect="1" noChangeArrowheads="1"/>
+          </p:cNvPicPr>
+          <p:nvPr/>
+        </p:nvPicPr>
+        <p:blipFill>
+          <a:blip r:embed="rId2">
+            <a:extLst>
+              <a:ext uri="{28A0092B-C50C-407E-A947-70E740481C1C}">
+                <a14:useLocalDpi xmlns:a14="http://schemas.microsoft.com/office/drawing/2010/main" val="0"/>
+              </a:ext>
+            </a:extLst>
+          </a:blip>
+          <a:srcRect/>
+          <a:stretch>
+            <a:fillRect/>
+          </a:stretch>
+        </p:blipFill>
+        <p:spPr bwMode="auto">
+          <a:xfrm>
+            <a:off x="920302" y="5134545"/>
+            <a:ext cx="398071" cy="307283"/>
+          </a:xfrm>
+          <a:prstGeom prst="rect">
+            <a:avLst/>
+          </a:prstGeom>
+          <a:noFill/>
+          <a:extLst>
+            <a:ext uri="{909E8E84-426E-40DD-AFC4-6F175D3DCCD1}">
+              <a14:hiddenFill xmlns:a14="http://schemas.microsoft.com/office/drawing/2010/main">
+                <a:solidFill>
+                  <a:srgbClr val="FFFFFF"/>
+                </a:solidFill>
+              </a14:hiddenFill>
+            </a:ext>
+          </a:extLst>
+        </p:spPr>
+      </p:pic>
+      <p:sp>
+        <p:nvSpPr>
+          <p:cNvPr id="52" name="CaixaDeTexto 51">
+            <a:extLst>
+              <a:ext uri="{FF2B5EF4-FFF2-40B4-BE49-F238E27FC236}">
+                <a16:creationId xmlns:a16="http://schemas.microsoft.com/office/drawing/2014/main" id="{251A6255-867A-09F0-119E-E5E33EE98DA2}"/>
+              </a:ext>
+            </a:extLst>
+          </p:cNvPr>
+          <p:cNvSpPr txBox="1"/>
+          <p:nvPr/>
+        </p:nvSpPr>
+        <p:spPr>
+          <a:xfrm>
+            <a:off x="1353693" y="5163120"/>
+            <a:ext cx="945830" cy="276999"/>
+          </a:xfrm>
+          <a:prstGeom prst="rect">
+            <a:avLst/>
+          </a:prstGeom>
+          <a:noFill/>
+        </p:spPr>
+        <p:txBody>
+          <a:bodyPr wrap="square">
+            <a:spAutoFit/>
+          </a:bodyPr>
+          <a:lstStyle/>
+          <a:p>
+            <a:r>
+              <a:rPr lang="pt-BR" sz="1200" dirty="0"/>
+              <a:t>UseCases</a:t>
+            </a:r>
+          </a:p>
+        </p:txBody>
+      </p:sp>
+      <p:sp>
+        <p:nvSpPr>
+          <p:cNvPr id="53" name="CaixaDeTexto 52">
+            <a:extLst>
+              <a:ext uri="{FF2B5EF4-FFF2-40B4-BE49-F238E27FC236}">
+                <a16:creationId xmlns:a16="http://schemas.microsoft.com/office/drawing/2014/main" id="{8ACE8285-8682-F23F-7E78-A927BE669DE1}"/>
+              </a:ext>
+            </a:extLst>
+          </p:cNvPr>
+          <p:cNvSpPr txBox="1"/>
+          <p:nvPr/>
+        </p:nvSpPr>
+        <p:spPr>
+          <a:xfrm>
+            <a:off x="1385108" y="5393166"/>
+            <a:ext cx="1881922" cy="646331"/>
+          </a:xfrm>
+          <a:prstGeom prst="rect">
+            <a:avLst/>
+          </a:prstGeom>
+          <a:noFill/>
+        </p:spPr>
+        <p:txBody>
+          <a:bodyPr wrap="square">
+            <a:spAutoFit/>
+          </a:bodyPr>
+          <a:lstStyle/>
+          <a:p>
+            <a:r>
+              <a:rPr lang="pt-BR" sz="1200" dirty="0">
+                <a:solidFill>
+                  <a:schemeClr val="accent6">
+                    <a:lumMod val="75000"/>
+                  </a:schemeClr>
+                </a:solidFill>
+              </a:rPr>
+              <a:t>Para criar o padrão </a:t>
+            </a:r>
+            <a:r>
+              <a:rPr lang="pt-BR" sz="1200" b="1" dirty="0">
+                <a:highlight>
+                  <a:srgbClr val="FFFF00"/>
+                </a:highlight>
+              </a:rPr>
+              <a:t>CQRS</a:t>
+            </a:r>
+          </a:p>
+          <a:p>
+            <a:r>
+              <a:rPr lang="pt-BR" sz="1200" dirty="0">
+                <a:solidFill>
+                  <a:schemeClr val="accent6">
+                    <a:lumMod val="75000"/>
+                  </a:schemeClr>
+                </a:solidFill>
+              </a:rPr>
+              <a:t>CreateUser, DeleteUser, UpdateUser, etc.</a:t>
+            </a:r>
+          </a:p>
+        </p:txBody>
+      </p:sp>
+      <p:cxnSp>
+        <p:nvCxnSpPr>
+          <p:cNvPr id="55" name="Conector: Angulado 54">
+            <a:extLst>
+              <a:ext uri="{FF2B5EF4-FFF2-40B4-BE49-F238E27FC236}">
+                <a16:creationId xmlns:a16="http://schemas.microsoft.com/office/drawing/2014/main" id="{2CE2B4B6-C83F-D7F6-431C-2784B03174ED}"/>
+              </a:ext>
+            </a:extLst>
+          </p:cNvPr>
+          <p:cNvCxnSpPr>
+            <a:stCxn id="13" idx="2"/>
+            <a:endCxn id="51" idx="1"/>
+          </p:cNvCxnSpPr>
+          <p:nvPr/>
+        </p:nvCxnSpPr>
+        <p:spPr>
+          <a:xfrm rot="16200000" flipH="1">
+            <a:off x="-148384" y="4219501"/>
+            <a:ext cx="2017926" cy="119445"/>
+          </a:xfrm>
+          <a:prstGeom prst="bentConnector2">
+            <a:avLst/>
+          </a:prstGeom>
+          <a:ln>
+            <a:tailEnd type="triangle"/>
+          </a:ln>
+        </p:spPr>
+        <p:style>
+          <a:lnRef idx="1">
+            <a:schemeClr val="accent1"/>
+          </a:lnRef>
+          <a:fillRef idx="0">
+            <a:schemeClr val="accent1"/>
+          </a:fillRef>
+          <a:effectRef idx="0">
+            <a:schemeClr val="accent1"/>
+          </a:effectRef>
+          <a:fontRef idx="minor">
+            <a:schemeClr val="tx1"/>
+          </a:fontRef>
+        </p:style>
+      </p:cxnSp>
+      <p:cxnSp>
+        <p:nvCxnSpPr>
+          <p:cNvPr id="57" name="Conector: Angulado 56">
+            <a:extLst>
+              <a:ext uri="{FF2B5EF4-FFF2-40B4-BE49-F238E27FC236}">
+                <a16:creationId xmlns:a16="http://schemas.microsoft.com/office/drawing/2014/main" id="{A754DF0C-6AAD-3A3B-5067-4EAE3DCFBE24}"/>
+              </a:ext>
+            </a:extLst>
+          </p:cNvPr>
+          <p:cNvCxnSpPr>
+            <a:stCxn id="9" idx="0"/>
+            <a:endCxn id="8" idx="0"/>
+          </p:cNvCxnSpPr>
+          <p:nvPr/>
+        </p:nvCxnSpPr>
+        <p:spPr>
+          <a:xfrm rot="16200000" flipH="1" flipV="1">
+            <a:off x="2484971" y="70675"/>
+            <a:ext cx="33592" cy="2660819"/>
+          </a:xfrm>
+          <a:prstGeom prst="bentConnector3">
+            <a:avLst>
+              <a:gd name="adj1" fmla="val -680519"/>
+            </a:avLst>
+          </a:prstGeom>
         </p:spPr>
         <p:style>
           <a:lnRef idx="1">
@@ -5597,6 +6400,736 @@
     <p:extLst>
       <p:ext uri="{BB962C8B-B14F-4D97-AF65-F5344CB8AC3E}">
         <p14:creationId xmlns:p14="http://schemas.microsoft.com/office/powerpoint/2010/main" val="164613507"/>
+      </p:ext>
+    </p:extLst>
+  </p:cSld>
+  <p:clrMapOvr>
+    <a:masterClrMapping/>
+  </p:clrMapOvr>
+</p:sld>
+</file>
+
+<file path=ppt/slides/slide4.xml><?xml version="1.0" encoding="utf-8"?>
+<p:sld xmlns:a="http://schemas.openxmlformats.org/drawingml/2006/main" xmlns:r="http://schemas.openxmlformats.org/officeDocument/2006/relationships" xmlns:p="http://schemas.openxmlformats.org/presentationml/2006/main">
+  <p:cSld>
+    <p:spTree>
+      <p:nvGrpSpPr>
+        <p:cNvPr id="1" name=""/>
+        <p:cNvGrpSpPr/>
+        <p:nvPr/>
+      </p:nvGrpSpPr>
+      <p:grpSpPr>
+        <a:xfrm>
+          <a:off x="0" y="0"/>
+          <a:ext cx="0" cy="0"/>
+          <a:chOff x="0" y="0"/>
+          <a:chExt cx="0" cy="0"/>
+        </a:xfrm>
+      </p:grpSpPr>
+      <p:sp>
+        <p:nvSpPr>
+          <p:cNvPr id="2" name="Título 1">
+            <a:extLst>
+              <a:ext uri="{FF2B5EF4-FFF2-40B4-BE49-F238E27FC236}">
+                <a16:creationId xmlns:a16="http://schemas.microsoft.com/office/drawing/2014/main" id="{D524FA62-3AFF-640F-3566-48ED38C2354D}"/>
+              </a:ext>
+            </a:extLst>
+          </p:cNvPr>
+          <p:cNvSpPr>
+            <a:spLocks noGrp="1"/>
+          </p:cNvSpPr>
+          <p:nvPr>
+            <p:ph type="title"/>
+          </p:nvPr>
+        </p:nvSpPr>
+        <p:spPr>
+          <a:xfrm>
+            <a:off x="524300" y="732168"/>
+            <a:ext cx="1522863" cy="1325563"/>
+          </a:xfrm>
+        </p:spPr>
+        <p:txBody>
+          <a:bodyPr/>
+          <a:lstStyle/>
+          <a:p>
+            <a:r>
+              <a:rPr lang="pt-BR" dirty="0"/>
+              <a:t>CQRS</a:t>
+            </a:r>
+          </a:p>
+        </p:txBody>
+      </p:sp>
+      <p:sp>
+        <p:nvSpPr>
+          <p:cNvPr id="3" name="Espaço Reservado para Conteúdo 2">
+            <a:extLst>
+              <a:ext uri="{FF2B5EF4-FFF2-40B4-BE49-F238E27FC236}">
+                <a16:creationId xmlns:a16="http://schemas.microsoft.com/office/drawing/2014/main" id="{92D3F935-1E83-DA44-CD82-F209D8BD6AA8}"/>
+              </a:ext>
+            </a:extLst>
+          </p:cNvPr>
+          <p:cNvSpPr>
+            <a:spLocks noGrp="1"/>
+          </p:cNvSpPr>
+          <p:nvPr>
+            <p:ph idx="1"/>
+          </p:nvPr>
+        </p:nvSpPr>
+        <p:spPr>
+          <a:xfrm>
+            <a:off x="2292824" y="732169"/>
+            <a:ext cx="8897203" cy="1325563"/>
+          </a:xfrm>
+        </p:spPr>
+        <p:txBody>
+          <a:bodyPr>
+            <a:normAutofit lnSpcReduction="10000"/>
+          </a:bodyPr>
+          <a:lstStyle/>
+          <a:p>
+            <a:pPr marL="0" indent="0">
+              <a:buNone/>
+            </a:pPr>
+            <a:r>
+              <a:rPr lang="pt-BR" sz="2000" dirty="0"/>
+              <a:t>O Padrão CQRS (Command Query Responsbility Segregation) separa as operações de leitura (queries) das operações de escrita (commands) em um sistema. Essa separação permite otimizar cada caminho de forma independente para atender as necessidades especificas podendo maximizar desempenho, escalabilidade e a segurança.</a:t>
+            </a:r>
+          </a:p>
+          <a:p>
+            <a:endParaRPr lang="pt-BR" sz="2000" dirty="0"/>
+          </a:p>
+        </p:txBody>
+      </p:sp>
+      <p:pic>
+        <p:nvPicPr>
+          <p:cNvPr id="5" name="Imagem 4">
+            <a:extLst>
+              <a:ext uri="{FF2B5EF4-FFF2-40B4-BE49-F238E27FC236}">
+                <a16:creationId xmlns:a16="http://schemas.microsoft.com/office/drawing/2014/main" id="{B82FE52A-4EF0-9EBF-42D8-982C0AE3BAA5}"/>
+              </a:ext>
+            </a:extLst>
+          </p:cNvPr>
+          <p:cNvPicPr>
+            <a:picLocks noChangeAspect="1"/>
+          </p:cNvPicPr>
+          <p:nvPr/>
+        </p:nvPicPr>
+        <p:blipFill>
+          <a:blip r:embed="rId2"/>
+          <a:stretch>
+            <a:fillRect/>
+          </a:stretch>
+        </p:blipFill>
+        <p:spPr>
+          <a:xfrm>
+            <a:off x="6108842" y="1921216"/>
+            <a:ext cx="5637156" cy="3015568"/>
+          </a:xfrm>
+          <a:prstGeom prst="rect">
+            <a:avLst/>
+          </a:prstGeom>
+        </p:spPr>
+      </p:pic>
+      <p:pic>
+        <p:nvPicPr>
+          <p:cNvPr id="7" name="Imagem 6">
+            <a:extLst>
+              <a:ext uri="{FF2B5EF4-FFF2-40B4-BE49-F238E27FC236}">
+                <a16:creationId xmlns:a16="http://schemas.microsoft.com/office/drawing/2014/main" id="{1A8F8D90-D669-749F-3A47-37D0AC6AC26A}"/>
+              </a:ext>
+            </a:extLst>
+          </p:cNvPr>
+          <p:cNvPicPr>
+            <a:picLocks noChangeAspect="1"/>
+          </p:cNvPicPr>
+          <p:nvPr/>
+        </p:nvPicPr>
+        <p:blipFill>
+          <a:blip r:embed="rId3"/>
+          <a:stretch>
+            <a:fillRect/>
+          </a:stretch>
+        </p:blipFill>
+        <p:spPr>
+          <a:xfrm>
+            <a:off x="887104" y="2207054"/>
+            <a:ext cx="5057963" cy="2443892"/>
+          </a:xfrm>
+          <a:prstGeom prst="rect">
+            <a:avLst/>
+          </a:prstGeom>
+        </p:spPr>
+      </p:pic>
+    </p:spTree>
+    <p:extLst>
+      <p:ext uri="{BB962C8B-B14F-4D97-AF65-F5344CB8AC3E}">
+        <p14:creationId xmlns:p14="http://schemas.microsoft.com/office/powerpoint/2010/main" val="3160961654"/>
+      </p:ext>
+    </p:extLst>
+  </p:cSld>
+  <p:clrMapOvr>
+    <a:masterClrMapping/>
+  </p:clrMapOvr>
+</p:sld>
+</file>
+
+<file path=ppt/slides/slide5.xml><?xml version="1.0" encoding="utf-8"?>
+<p:sld xmlns:a="http://schemas.openxmlformats.org/drawingml/2006/main" xmlns:r="http://schemas.openxmlformats.org/officeDocument/2006/relationships" xmlns:p="http://schemas.openxmlformats.org/presentationml/2006/main">
+  <p:cSld>
+    <p:spTree>
+      <p:nvGrpSpPr>
+        <p:cNvPr id="1" name=""/>
+        <p:cNvGrpSpPr/>
+        <p:nvPr/>
+      </p:nvGrpSpPr>
+      <p:grpSpPr>
+        <a:xfrm>
+          <a:off x="0" y="0"/>
+          <a:ext cx="0" cy="0"/>
+          <a:chOff x="0" y="0"/>
+          <a:chExt cx="0" cy="0"/>
+        </a:xfrm>
+      </p:grpSpPr>
+      <p:sp>
+        <p:nvSpPr>
+          <p:cNvPr id="4" name="Título 1">
+            <a:extLst>
+              <a:ext uri="{FF2B5EF4-FFF2-40B4-BE49-F238E27FC236}">
+                <a16:creationId xmlns:a16="http://schemas.microsoft.com/office/drawing/2014/main" id="{ADEB5557-8E48-7F7B-3670-3E824DF4B27D}"/>
+              </a:ext>
+            </a:extLst>
+          </p:cNvPr>
+          <p:cNvSpPr>
+            <a:spLocks noGrp="1"/>
+          </p:cNvSpPr>
+          <p:nvPr>
+            <p:ph type="title"/>
+          </p:nvPr>
+        </p:nvSpPr>
+        <p:spPr>
+          <a:xfrm>
+            <a:off x="703140" y="691226"/>
+            <a:ext cx="1127078" cy="891915"/>
+          </a:xfrm>
+        </p:spPr>
+        <p:txBody>
+          <a:bodyPr>
+            <a:normAutofit/>
+          </a:bodyPr>
+          <a:lstStyle/>
+          <a:p>
+            <a:pPr algn="ctr"/>
+            <a:r>
+              <a:rPr lang="pt-BR" sz="3200" dirty="0"/>
+              <a:t>CQRS</a:t>
+            </a:r>
+          </a:p>
+        </p:txBody>
+      </p:sp>
+      <p:sp>
+        <p:nvSpPr>
+          <p:cNvPr id="5" name="Título 1">
+            <a:extLst>
+              <a:ext uri="{FF2B5EF4-FFF2-40B4-BE49-F238E27FC236}">
+                <a16:creationId xmlns:a16="http://schemas.microsoft.com/office/drawing/2014/main" id="{461D4C02-269D-9530-FFB7-958222A2BA4B}"/>
+              </a:ext>
+            </a:extLst>
+          </p:cNvPr>
+          <p:cNvSpPr txBox="1">
+            <a:spLocks/>
+          </p:cNvSpPr>
+          <p:nvPr/>
+        </p:nvSpPr>
+        <p:spPr>
+          <a:xfrm>
+            <a:off x="1386383" y="2347153"/>
+            <a:ext cx="1807193" cy="891915"/>
+          </a:xfrm>
+          <a:prstGeom prst="rect">
+            <a:avLst/>
+          </a:prstGeom>
+        </p:spPr>
+        <p:txBody>
+          <a:bodyPr vert="horz" lIns="91440" tIns="45720" rIns="91440" bIns="45720" rtlCol="0" anchor="ctr">
+            <a:normAutofit/>
+          </a:bodyPr>
+          <a:lstStyle>
+            <a:lvl1pPr algn="l" defTabSz="914400" rtl="0" eaLnBrk="1" latinLnBrk="0" hangingPunct="1">
+              <a:lnSpc>
+                <a:spcPct val="90000"/>
+              </a:lnSpc>
+              <a:spcBef>
+                <a:spcPct val="0"/>
+              </a:spcBef>
+              <a:buNone/>
+              <a:defRPr sz="4400" kern="1200">
+                <a:solidFill>
+                  <a:schemeClr val="tx1"/>
+                </a:solidFill>
+                <a:latin typeface="+mj-lt"/>
+                <a:ea typeface="+mj-ea"/>
+                <a:cs typeface="+mj-cs"/>
+              </a:defRPr>
+            </a:lvl1pPr>
+          </a:lstStyle>
+          <a:p>
+            <a:pPr algn="ctr"/>
+            <a:r>
+              <a:rPr lang="pt-BR" sz="3200" dirty="0"/>
+              <a:t>REQUEST</a:t>
+            </a:r>
+          </a:p>
+        </p:txBody>
+      </p:sp>
+      <p:sp>
+        <p:nvSpPr>
+          <p:cNvPr id="6" name="Título 1">
+            <a:extLst>
+              <a:ext uri="{FF2B5EF4-FFF2-40B4-BE49-F238E27FC236}">
+                <a16:creationId xmlns:a16="http://schemas.microsoft.com/office/drawing/2014/main" id="{41993503-ED32-A111-5C13-CE5DE998E62C}"/>
+              </a:ext>
+            </a:extLst>
+          </p:cNvPr>
+          <p:cNvSpPr txBox="1">
+            <a:spLocks/>
+          </p:cNvSpPr>
+          <p:nvPr/>
+        </p:nvSpPr>
+        <p:spPr>
+          <a:xfrm>
+            <a:off x="3193576" y="2810393"/>
+            <a:ext cx="2064793" cy="891915"/>
+          </a:xfrm>
+          <a:prstGeom prst="rect">
+            <a:avLst/>
+          </a:prstGeom>
+        </p:spPr>
+        <p:txBody>
+          <a:bodyPr vert="horz" lIns="91440" tIns="45720" rIns="91440" bIns="45720" rtlCol="0" anchor="ctr">
+            <a:normAutofit/>
+          </a:bodyPr>
+          <a:lstStyle>
+            <a:lvl1pPr algn="l" defTabSz="914400" rtl="0" eaLnBrk="1" latinLnBrk="0" hangingPunct="1">
+              <a:lnSpc>
+                <a:spcPct val="90000"/>
+              </a:lnSpc>
+              <a:spcBef>
+                <a:spcPct val="0"/>
+              </a:spcBef>
+              <a:buNone/>
+              <a:defRPr sz="4400" kern="1200">
+                <a:solidFill>
+                  <a:schemeClr val="tx1"/>
+                </a:solidFill>
+                <a:latin typeface="+mj-lt"/>
+                <a:ea typeface="+mj-ea"/>
+                <a:cs typeface="+mj-cs"/>
+              </a:defRPr>
+            </a:lvl1pPr>
+          </a:lstStyle>
+          <a:p>
+            <a:pPr algn="ctr"/>
+            <a:r>
+              <a:rPr lang="pt-BR" sz="3200" dirty="0"/>
+              <a:t>RESPONSE</a:t>
+            </a:r>
+          </a:p>
+        </p:txBody>
+      </p:sp>
+      <p:sp>
+        <p:nvSpPr>
+          <p:cNvPr id="7" name="Título 1">
+            <a:extLst>
+              <a:ext uri="{FF2B5EF4-FFF2-40B4-BE49-F238E27FC236}">
+                <a16:creationId xmlns:a16="http://schemas.microsoft.com/office/drawing/2014/main" id="{C2A656C0-8DC6-FA94-B0E6-4918C56FA375}"/>
+              </a:ext>
+            </a:extLst>
+          </p:cNvPr>
+          <p:cNvSpPr txBox="1">
+            <a:spLocks/>
+          </p:cNvSpPr>
+          <p:nvPr/>
+        </p:nvSpPr>
+        <p:spPr>
+          <a:xfrm>
+            <a:off x="703140" y="3891601"/>
+            <a:ext cx="2064793" cy="891915"/>
+          </a:xfrm>
+          <a:prstGeom prst="rect">
+            <a:avLst/>
+          </a:prstGeom>
+        </p:spPr>
+        <p:txBody>
+          <a:bodyPr vert="horz" lIns="91440" tIns="45720" rIns="91440" bIns="45720" rtlCol="0" anchor="ctr">
+            <a:normAutofit lnSpcReduction="10000"/>
+          </a:bodyPr>
+          <a:lstStyle>
+            <a:lvl1pPr algn="l" defTabSz="914400" rtl="0" eaLnBrk="1" latinLnBrk="0" hangingPunct="1">
+              <a:lnSpc>
+                <a:spcPct val="90000"/>
+              </a:lnSpc>
+              <a:spcBef>
+                <a:spcPct val="0"/>
+              </a:spcBef>
+              <a:buNone/>
+              <a:defRPr sz="4400" kern="1200">
+                <a:solidFill>
+                  <a:schemeClr val="tx1"/>
+                </a:solidFill>
+                <a:latin typeface="+mj-lt"/>
+                <a:ea typeface="+mj-ea"/>
+                <a:cs typeface="+mj-cs"/>
+              </a:defRPr>
+            </a:lvl1pPr>
+          </a:lstStyle>
+          <a:p>
+            <a:pPr algn="ctr"/>
+            <a:r>
+              <a:rPr lang="pt-BR" sz="3200" dirty="0"/>
+              <a:t>MEDIATOR</a:t>
+            </a:r>
+          </a:p>
+          <a:p>
+            <a:pPr algn="ctr"/>
+            <a:r>
+              <a:rPr lang="pt-BR" sz="3200" dirty="0"/>
+              <a:t>MEDIATR</a:t>
+            </a:r>
+          </a:p>
+        </p:txBody>
+      </p:sp>
+      <p:sp>
+        <p:nvSpPr>
+          <p:cNvPr id="9" name="CaixaDeTexto 8">
+            <a:extLst>
+              <a:ext uri="{FF2B5EF4-FFF2-40B4-BE49-F238E27FC236}">
+                <a16:creationId xmlns:a16="http://schemas.microsoft.com/office/drawing/2014/main" id="{97008F16-5B43-76EA-20E8-246952F93B19}"/>
+              </a:ext>
+            </a:extLst>
+          </p:cNvPr>
+          <p:cNvSpPr txBox="1"/>
+          <p:nvPr/>
+        </p:nvSpPr>
+        <p:spPr>
+          <a:xfrm>
+            <a:off x="3081840" y="4633751"/>
+            <a:ext cx="3217459" cy="1421928"/>
+          </a:xfrm>
+          <a:prstGeom prst="rect">
+            <a:avLst/>
+          </a:prstGeom>
+        </p:spPr>
+        <p:txBody>
+          <a:bodyPr vert="horz" lIns="91440" tIns="45720" rIns="91440" bIns="45720" rtlCol="0" anchor="ctr">
+            <a:normAutofit/>
+          </a:bodyPr>
+          <a:lstStyle>
+            <a:defPPr>
+              <a:defRPr lang="pt-BR"/>
+            </a:defPPr>
+            <a:lvl1pPr algn="ctr">
+              <a:lnSpc>
+                <a:spcPct val="90000"/>
+              </a:lnSpc>
+              <a:spcBef>
+                <a:spcPct val="0"/>
+              </a:spcBef>
+              <a:buNone/>
+              <a:defRPr sz="3200">
+                <a:latin typeface="+mj-lt"/>
+                <a:ea typeface="+mj-ea"/>
+                <a:cs typeface="+mj-cs"/>
+              </a:defRPr>
+            </a:lvl1pPr>
+          </a:lstStyle>
+          <a:p>
+            <a:r>
+              <a:rPr lang="en-US" dirty="0"/>
+              <a:t>CLEAN ARCHITECTURE</a:t>
+            </a:r>
+            <a:endParaRPr lang="pt-BR" dirty="0"/>
+          </a:p>
+        </p:txBody>
+      </p:sp>
+      <p:sp>
+        <p:nvSpPr>
+          <p:cNvPr id="10" name="Título 1">
+            <a:extLst>
+              <a:ext uri="{FF2B5EF4-FFF2-40B4-BE49-F238E27FC236}">
+                <a16:creationId xmlns:a16="http://schemas.microsoft.com/office/drawing/2014/main" id="{AA1B9813-0A32-5259-FF69-CA7F2C70AA65}"/>
+              </a:ext>
+            </a:extLst>
+          </p:cNvPr>
+          <p:cNvSpPr txBox="1">
+            <a:spLocks/>
+          </p:cNvSpPr>
+          <p:nvPr/>
+        </p:nvSpPr>
+        <p:spPr>
+          <a:xfrm>
+            <a:off x="3577986" y="987035"/>
+            <a:ext cx="2518013" cy="891915"/>
+          </a:xfrm>
+          <a:prstGeom prst="rect">
+            <a:avLst/>
+          </a:prstGeom>
+        </p:spPr>
+        <p:txBody>
+          <a:bodyPr vert="horz" lIns="91440" tIns="45720" rIns="91440" bIns="45720" rtlCol="0" anchor="ctr">
+            <a:normAutofit/>
+          </a:bodyPr>
+          <a:lstStyle>
+            <a:lvl1pPr algn="l" defTabSz="914400" rtl="0" eaLnBrk="1" latinLnBrk="0" hangingPunct="1">
+              <a:lnSpc>
+                <a:spcPct val="90000"/>
+              </a:lnSpc>
+              <a:spcBef>
+                <a:spcPct val="0"/>
+              </a:spcBef>
+              <a:buNone/>
+              <a:defRPr sz="4400" kern="1200">
+                <a:solidFill>
+                  <a:schemeClr val="tx1"/>
+                </a:solidFill>
+                <a:latin typeface="+mj-lt"/>
+                <a:ea typeface="+mj-ea"/>
+                <a:cs typeface="+mj-cs"/>
+              </a:defRPr>
+            </a:lvl1pPr>
+          </a:lstStyle>
+          <a:p>
+            <a:pPr algn="ctr"/>
+            <a:r>
+              <a:rPr lang="pt-BR" sz="3200" dirty="0"/>
+              <a:t>AUTOMAPPER</a:t>
+            </a:r>
+          </a:p>
+        </p:txBody>
+      </p:sp>
+      <p:sp>
+        <p:nvSpPr>
+          <p:cNvPr id="11" name="Título 1">
+            <a:extLst>
+              <a:ext uri="{FF2B5EF4-FFF2-40B4-BE49-F238E27FC236}">
+                <a16:creationId xmlns:a16="http://schemas.microsoft.com/office/drawing/2014/main" id="{C4E348C3-6FBA-E8B2-DB50-9C338D81E4F8}"/>
+              </a:ext>
+            </a:extLst>
+          </p:cNvPr>
+          <p:cNvSpPr txBox="1">
+            <a:spLocks/>
+          </p:cNvSpPr>
+          <p:nvPr/>
+        </p:nvSpPr>
+        <p:spPr>
+          <a:xfrm>
+            <a:off x="5892703" y="2699830"/>
+            <a:ext cx="3537900" cy="891915"/>
+          </a:xfrm>
+          <a:prstGeom prst="rect">
+            <a:avLst/>
+          </a:prstGeom>
+        </p:spPr>
+        <p:txBody>
+          <a:bodyPr vert="horz" lIns="91440" tIns="45720" rIns="91440" bIns="45720" rtlCol="0" anchor="ctr">
+            <a:normAutofit/>
+          </a:bodyPr>
+          <a:lstStyle>
+            <a:lvl1pPr algn="l" defTabSz="914400" rtl="0" eaLnBrk="1" latinLnBrk="0" hangingPunct="1">
+              <a:lnSpc>
+                <a:spcPct val="90000"/>
+              </a:lnSpc>
+              <a:spcBef>
+                <a:spcPct val="0"/>
+              </a:spcBef>
+              <a:buNone/>
+              <a:defRPr sz="4400" kern="1200">
+                <a:solidFill>
+                  <a:schemeClr val="tx1"/>
+                </a:solidFill>
+                <a:latin typeface="+mj-lt"/>
+                <a:ea typeface="+mj-ea"/>
+                <a:cs typeface="+mj-cs"/>
+              </a:defRPr>
+            </a:lvl1pPr>
+          </a:lstStyle>
+          <a:p>
+            <a:pPr algn="ctr"/>
+            <a:r>
+              <a:rPr lang="pt-BR" sz="3200" dirty="0"/>
+              <a:t>FLUENTVALIDATION</a:t>
+            </a:r>
+          </a:p>
+        </p:txBody>
+      </p:sp>
+      <p:sp>
+        <p:nvSpPr>
+          <p:cNvPr id="12" name="Título 1">
+            <a:extLst>
+              <a:ext uri="{FF2B5EF4-FFF2-40B4-BE49-F238E27FC236}">
+                <a16:creationId xmlns:a16="http://schemas.microsoft.com/office/drawing/2014/main" id="{47A32E83-5131-780A-9440-86157F0975A3}"/>
+              </a:ext>
+            </a:extLst>
+          </p:cNvPr>
+          <p:cNvSpPr txBox="1">
+            <a:spLocks/>
+          </p:cNvSpPr>
+          <p:nvPr/>
+        </p:nvSpPr>
+        <p:spPr>
+          <a:xfrm>
+            <a:off x="4844256" y="3891601"/>
+            <a:ext cx="3537900" cy="891915"/>
+          </a:xfrm>
+          <a:prstGeom prst="rect">
+            <a:avLst/>
+          </a:prstGeom>
+        </p:spPr>
+        <p:txBody>
+          <a:bodyPr vert="horz" lIns="91440" tIns="45720" rIns="91440" bIns="45720" rtlCol="0" anchor="ctr">
+            <a:normAutofit/>
+          </a:bodyPr>
+          <a:lstStyle>
+            <a:lvl1pPr algn="l" defTabSz="914400" rtl="0" eaLnBrk="1" latinLnBrk="0" hangingPunct="1">
+              <a:lnSpc>
+                <a:spcPct val="90000"/>
+              </a:lnSpc>
+              <a:spcBef>
+                <a:spcPct val="0"/>
+              </a:spcBef>
+              <a:buNone/>
+              <a:defRPr sz="4400" kern="1200">
+                <a:solidFill>
+                  <a:schemeClr val="tx1"/>
+                </a:solidFill>
+                <a:latin typeface="+mj-lt"/>
+                <a:ea typeface="+mj-ea"/>
+                <a:cs typeface="+mj-cs"/>
+              </a:defRPr>
+            </a:lvl1pPr>
+          </a:lstStyle>
+          <a:p>
+            <a:pPr algn="ctr"/>
+            <a:r>
+              <a:rPr lang="pt-BR" sz="3200" dirty="0"/>
+              <a:t>QUERY</a:t>
+            </a:r>
+          </a:p>
+        </p:txBody>
+      </p:sp>
+      <p:sp>
+        <p:nvSpPr>
+          <p:cNvPr id="13" name="Título 1">
+            <a:extLst>
+              <a:ext uri="{FF2B5EF4-FFF2-40B4-BE49-F238E27FC236}">
+                <a16:creationId xmlns:a16="http://schemas.microsoft.com/office/drawing/2014/main" id="{2E25EEEA-5F31-340B-3CAC-1678D7F9AA9C}"/>
+              </a:ext>
+            </a:extLst>
+          </p:cNvPr>
+          <p:cNvSpPr txBox="1">
+            <a:spLocks/>
+          </p:cNvSpPr>
+          <p:nvPr/>
+        </p:nvSpPr>
+        <p:spPr>
+          <a:xfrm>
+            <a:off x="7188679" y="5083372"/>
+            <a:ext cx="3537900" cy="891915"/>
+          </a:xfrm>
+          <a:prstGeom prst="rect">
+            <a:avLst/>
+          </a:prstGeom>
+        </p:spPr>
+        <p:txBody>
+          <a:bodyPr vert="horz" lIns="91440" tIns="45720" rIns="91440" bIns="45720" rtlCol="0" anchor="ctr">
+            <a:normAutofit/>
+          </a:bodyPr>
+          <a:lstStyle>
+            <a:lvl1pPr algn="l" defTabSz="914400" rtl="0" eaLnBrk="1" latinLnBrk="0" hangingPunct="1">
+              <a:lnSpc>
+                <a:spcPct val="90000"/>
+              </a:lnSpc>
+              <a:spcBef>
+                <a:spcPct val="0"/>
+              </a:spcBef>
+              <a:buNone/>
+              <a:defRPr sz="4400" kern="1200">
+                <a:solidFill>
+                  <a:schemeClr val="tx1"/>
+                </a:solidFill>
+                <a:latin typeface="+mj-lt"/>
+                <a:ea typeface="+mj-ea"/>
+                <a:cs typeface="+mj-cs"/>
+              </a:defRPr>
+            </a:lvl1pPr>
+          </a:lstStyle>
+          <a:p>
+            <a:pPr algn="ctr"/>
+            <a:r>
+              <a:rPr lang="pt-BR" sz="3200" dirty="0"/>
+              <a:t>COMMAND</a:t>
+            </a:r>
+          </a:p>
+        </p:txBody>
+      </p:sp>
+      <p:sp>
+        <p:nvSpPr>
+          <p:cNvPr id="14" name="Título 1">
+            <a:extLst>
+              <a:ext uri="{FF2B5EF4-FFF2-40B4-BE49-F238E27FC236}">
+                <a16:creationId xmlns:a16="http://schemas.microsoft.com/office/drawing/2014/main" id="{AA8FCB5E-1377-B320-A56E-047B75997FE7}"/>
+              </a:ext>
+            </a:extLst>
+          </p:cNvPr>
+          <p:cNvSpPr txBox="1">
+            <a:spLocks/>
+          </p:cNvSpPr>
+          <p:nvPr/>
+        </p:nvSpPr>
+        <p:spPr>
+          <a:xfrm>
+            <a:off x="6613206" y="762245"/>
+            <a:ext cx="2518013" cy="891915"/>
+          </a:xfrm>
+          <a:prstGeom prst="rect">
+            <a:avLst/>
+          </a:prstGeom>
+        </p:spPr>
+        <p:txBody>
+          <a:bodyPr vert="horz" lIns="91440" tIns="45720" rIns="91440" bIns="45720" rtlCol="0" anchor="ctr">
+            <a:noAutofit/>
+          </a:bodyPr>
+          <a:lstStyle>
+            <a:lvl1pPr algn="l" defTabSz="914400" rtl="0" eaLnBrk="1" latinLnBrk="0" hangingPunct="1">
+              <a:lnSpc>
+                <a:spcPct val="90000"/>
+              </a:lnSpc>
+              <a:spcBef>
+                <a:spcPct val="0"/>
+              </a:spcBef>
+              <a:buNone/>
+              <a:defRPr sz="4400" kern="1200">
+                <a:solidFill>
+                  <a:schemeClr val="tx1"/>
+                </a:solidFill>
+                <a:latin typeface="+mj-lt"/>
+                <a:ea typeface="+mj-ea"/>
+                <a:cs typeface="+mj-cs"/>
+              </a:defRPr>
+            </a:lvl1pPr>
+          </a:lstStyle>
+          <a:p>
+            <a:pPr algn="ctr"/>
+            <a:r>
+              <a:rPr lang="pt-BR" sz="3200" dirty="0"/>
+              <a:t>DEPENDENCY INJECTION</a:t>
+            </a:r>
+          </a:p>
+        </p:txBody>
+      </p:sp>
+    </p:spTree>
+    <p:extLst>
+      <p:ext uri="{BB962C8B-B14F-4D97-AF65-F5344CB8AC3E}">
+        <p14:creationId xmlns:p14="http://schemas.microsoft.com/office/powerpoint/2010/main" val="1396696114"/>
       </p:ext>
     </p:extLst>
   </p:cSld>

</xml_diff>

<commit_message>
Finalização do projeto implementando os métodos GET, PUT, DELETE na arquitetura Clean Archicteture  com CQRS.
</commit_message>
<xml_diff>
--- a/CleanArchitecture.WebAPI/AppData/Usando a Clean Architecture.pptx
+++ b/CleanArchitecture.WebAPI/AppData/Usando a Clean Architecture.pptx
@@ -9,7 +9,9 @@
     <p:sldId id="257" r:id="rId3"/>
     <p:sldId id="258" r:id="rId4"/>
     <p:sldId id="259" r:id="rId5"/>
-    <p:sldId id="260" r:id="rId6"/>
+    <p:sldId id="261" r:id="rId6"/>
+    <p:sldId id="262" r:id="rId7"/>
+    <p:sldId id="260" r:id="rId8"/>
   </p:sldIdLst>
   <p:sldSz cx="12192000" cy="6858000"/>
   <p:notesSz cx="6858000" cy="9144000"/>
@@ -263,7 +265,7 @@
           <a:p>
             <a:fld id="{48CCDA92-27FB-42B3-A511-B694CC1D85BD}" type="datetimeFigureOut">
               <a:rPr lang="pt-BR" smtClean="0"/>
-              <a:t>17/10/2023</a:t>
+              <a:t>18/10/2023</a:t>
             </a:fld>
             <a:endParaRPr lang="pt-BR"/>
           </a:p>
@@ -461,7 +463,7 @@
           <a:p>
             <a:fld id="{48CCDA92-27FB-42B3-A511-B694CC1D85BD}" type="datetimeFigureOut">
               <a:rPr lang="pt-BR" smtClean="0"/>
-              <a:t>17/10/2023</a:t>
+              <a:t>18/10/2023</a:t>
             </a:fld>
             <a:endParaRPr lang="pt-BR"/>
           </a:p>
@@ -669,7 +671,7 @@
           <a:p>
             <a:fld id="{48CCDA92-27FB-42B3-A511-B694CC1D85BD}" type="datetimeFigureOut">
               <a:rPr lang="pt-BR" smtClean="0"/>
-              <a:t>17/10/2023</a:t>
+              <a:t>18/10/2023</a:t>
             </a:fld>
             <a:endParaRPr lang="pt-BR"/>
           </a:p>
@@ -867,7 +869,7 @@
           <a:p>
             <a:fld id="{48CCDA92-27FB-42B3-A511-B694CC1D85BD}" type="datetimeFigureOut">
               <a:rPr lang="pt-BR" smtClean="0"/>
-              <a:t>17/10/2023</a:t>
+              <a:t>18/10/2023</a:t>
             </a:fld>
             <a:endParaRPr lang="pt-BR"/>
           </a:p>
@@ -1142,7 +1144,7 @@
           <a:p>
             <a:fld id="{48CCDA92-27FB-42B3-A511-B694CC1D85BD}" type="datetimeFigureOut">
               <a:rPr lang="pt-BR" smtClean="0"/>
-              <a:t>17/10/2023</a:t>
+              <a:t>18/10/2023</a:t>
             </a:fld>
             <a:endParaRPr lang="pt-BR"/>
           </a:p>
@@ -1407,7 +1409,7 @@
           <a:p>
             <a:fld id="{48CCDA92-27FB-42B3-A511-B694CC1D85BD}" type="datetimeFigureOut">
               <a:rPr lang="pt-BR" smtClean="0"/>
-              <a:t>17/10/2023</a:t>
+              <a:t>18/10/2023</a:t>
             </a:fld>
             <a:endParaRPr lang="pt-BR"/>
           </a:p>
@@ -1819,7 +1821,7 @@
           <a:p>
             <a:fld id="{48CCDA92-27FB-42B3-A511-B694CC1D85BD}" type="datetimeFigureOut">
               <a:rPr lang="pt-BR" smtClean="0"/>
-              <a:t>17/10/2023</a:t>
+              <a:t>18/10/2023</a:t>
             </a:fld>
             <a:endParaRPr lang="pt-BR"/>
           </a:p>
@@ -1960,7 +1962,7 @@
           <a:p>
             <a:fld id="{48CCDA92-27FB-42B3-A511-B694CC1D85BD}" type="datetimeFigureOut">
               <a:rPr lang="pt-BR" smtClean="0"/>
-              <a:t>17/10/2023</a:t>
+              <a:t>18/10/2023</a:t>
             </a:fld>
             <a:endParaRPr lang="pt-BR"/>
           </a:p>
@@ -2073,7 +2075,7 @@
           <a:p>
             <a:fld id="{48CCDA92-27FB-42B3-A511-B694CC1D85BD}" type="datetimeFigureOut">
               <a:rPr lang="pt-BR" smtClean="0"/>
-              <a:t>17/10/2023</a:t>
+              <a:t>18/10/2023</a:t>
             </a:fld>
             <a:endParaRPr lang="pt-BR"/>
           </a:p>
@@ -2384,7 +2386,7 @@
           <a:p>
             <a:fld id="{48CCDA92-27FB-42B3-A511-B694CC1D85BD}" type="datetimeFigureOut">
               <a:rPr lang="pt-BR" smtClean="0"/>
-              <a:t>17/10/2023</a:t>
+              <a:t>18/10/2023</a:t>
             </a:fld>
             <a:endParaRPr lang="pt-BR"/>
           </a:p>
@@ -2672,7 +2674,7 @@
           <a:p>
             <a:fld id="{48CCDA92-27FB-42B3-A511-B694CC1D85BD}" type="datetimeFigureOut">
               <a:rPr lang="pt-BR" smtClean="0"/>
-              <a:t>17/10/2023</a:t>
+              <a:t>18/10/2023</a:t>
             </a:fld>
             <a:endParaRPr lang="pt-BR"/>
           </a:p>
@@ -2913,7 +2915,7 @@
           <a:p>
             <a:fld id="{48CCDA92-27FB-42B3-A511-B694CC1D85BD}" type="datetimeFigureOut">
               <a:rPr lang="pt-BR" smtClean="0"/>
-              <a:t>17/10/2023</a:t>
+              <a:t>18/10/2023</a:t>
             </a:fld>
             <a:endParaRPr lang="pt-BR"/>
           </a:p>
@@ -6522,7 +6524,7 @@
         </p:blipFill>
         <p:spPr>
           <a:xfrm>
-            <a:off x="6108842" y="1921216"/>
+            <a:off x="6030544" y="2794673"/>
             <a:ext cx="5637156" cy="3015568"/>
           </a:xfrm>
           <a:prstGeom prst="rect">
@@ -6552,7 +6554,7 @@
         </p:blipFill>
         <p:spPr>
           <a:xfrm>
-            <a:off x="887104" y="2207054"/>
+            <a:off x="524300" y="3080511"/>
             <a:ext cx="5057963" cy="2443892"/>
           </a:xfrm>
           <a:prstGeom prst="rect">
@@ -6574,6 +6576,96 @@
 </file>
 
 <file path=ppt/slides/slide5.xml><?xml version="1.0" encoding="utf-8"?>
+<p:sld xmlns:a="http://schemas.openxmlformats.org/drawingml/2006/main" xmlns:r="http://schemas.openxmlformats.org/officeDocument/2006/relationships" xmlns:p="http://schemas.openxmlformats.org/presentationml/2006/main">
+  <p:cSld>
+    <p:spTree>
+      <p:nvGrpSpPr>
+        <p:cNvPr id="1" name=""/>
+        <p:cNvGrpSpPr/>
+        <p:nvPr/>
+      </p:nvGrpSpPr>
+      <p:grpSpPr>
+        <a:xfrm>
+          <a:off x="0" y="0"/>
+          <a:ext cx="0" cy="0"/>
+          <a:chOff x="0" y="0"/>
+          <a:chExt cx="0" cy="0"/>
+        </a:xfrm>
+      </p:grpSpPr>
+      <p:pic>
+        <p:nvPicPr>
+          <p:cNvPr id="9" name="Imagem 8">
+            <a:extLst>
+              <a:ext uri="{FF2B5EF4-FFF2-40B4-BE49-F238E27FC236}">
+                <a16:creationId xmlns:a16="http://schemas.microsoft.com/office/drawing/2014/main" id="{95DEEF6D-688D-94E7-6D6F-C36563CDB943}"/>
+              </a:ext>
+            </a:extLst>
+          </p:cNvPr>
+          <p:cNvPicPr>
+            <a:picLocks noChangeAspect="1"/>
+          </p:cNvPicPr>
+          <p:nvPr/>
+        </p:nvPicPr>
+        <p:blipFill>
+          <a:blip r:embed="rId2"/>
+          <a:stretch>
+            <a:fillRect/>
+          </a:stretch>
+        </p:blipFill>
+        <p:spPr>
+          <a:xfrm>
+            <a:off x="0" y="0"/>
+            <a:ext cx="12192000" cy="6858000"/>
+          </a:xfrm>
+          <a:prstGeom prst="rect">
+            <a:avLst/>
+          </a:prstGeom>
+        </p:spPr>
+      </p:pic>
+    </p:spTree>
+    <p:extLst>
+      <p:ext uri="{BB962C8B-B14F-4D97-AF65-F5344CB8AC3E}">
+        <p14:creationId xmlns:p14="http://schemas.microsoft.com/office/powerpoint/2010/main" val="1720838057"/>
+      </p:ext>
+    </p:extLst>
+  </p:cSld>
+  <p:clrMapOvr>
+    <a:masterClrMapping/>
+  </p:clrMapOvr>
+</p:sld>
+</file>
+
+<file path=ppt/slides/slide6.xml><?xml version="1.0" encoding="utf-8"?>
+<p:sld xmlns:a="http://schemas.openxmlformats.org/drawingml/2006/main" xmlns:r="http://schemas.openxmlformats.org/officeDocument/2006/relationships" xmlns:p="http://schemas.openxmlformats.org/presentationml/2006/main">
+  <p:cSld>
+    <p:spTree>
+      <p:nvGrpSpPr>
+        <p:cNvPr id="1" name=""/>
+        <p:cNvGrpSpPr/>
+        <p:nvPr/>
+      </p:nvGrpSpPr>
+      <p:grpSpPr>
+        <a:xfrm>
+          <a:off x="0" y="0"/>
+          <a:ext cx="0" cy="0"/>
+          <a:chOff x="0" y="0"/>
+          <a:chExt cx="0" cy="0"/>
+        </a:xfrm>
+      </p:grpSpPr>
+    </p:spTree>
+    <p:extLst>
+      <p:ext uri="{BB962C8B-B14F-4D97-AF65-F5344CB8AC3E}">
+        <p14:creationId xmlns:p14="http://schemas.microsoft.com/office/powerpoint/2010/main" val="1956172876"/>
+      </p:ext>
+    </p:extLst>
+  </p:cSld>
+  <p:clrMapOvr>
+    <a:masterClrMapping/>
+  </p:clrMapOvr>
+</p:sld>
+</file>
+
+<file path=ppt/slides/slide7.xml><?xml version="1.0" encoding="utf-8"?>
 <p:sld xmlns:a="http://schemas.openxmlformats.org/drawingml/2006/main" xmlns:r="http://schemas.openxmlformats.org/officeDocument/2006/relationships" xmlns:p="http://schemas.openxmlformats.org/presentationml/2006/main">
   <p:cSld>
     <p:spTree>

</xml_diff>